<commit_message>
Update Smart Floor Cleaner Report.pptx
</commit_message>
<xml_diff>
--- a/Smart Floor Cleaner/Smart Floor Cleaner Report.pptx
+++ b/Smart Floor Cleaner/Smart Floor Cleaner Report.pptx
@@ -113,6 +113,11 @@
       </a:defRPr>
     </a:lvl9pPr>
   </p:defaultTextStyle>
+  <p:extLst>
+    <p:ext uri="{EFAFB233-063F-42B5-8137-9DF3F51BA10A}">
+      <p15:sldGuideLst xmlns:p15="http://schemas.microsoft.com/office/powerpoint/2012/main"/>
+    </p:ext>
+  </p:extLst>
 </p:presentation>
 </file>
 
@@ -305,7 +310,7 @@
             <a:fld id="{B61BEF0D-F0BB-DE4B-95CE-6DB70DBA9567}" type="datetimeFigureOut">
               <a:rPr lang="en-US" dirty="0"/>
               <a:pPr/>
-              <a:t>5/10/2019</a:t>
+              <a:t>10/26/2021</a:t>
             </a:fld>
             <a:endParaRPr lang="en-US" dirty="0"/>
           </a:p>
@@ -640,7 +645,7 @@
             <a:fld id="{B61BEF0D-F0BB-DE4B-95CE-6DB70DBA9567}" type="datetimeFigureOut">
               <a:rPr lang="en-US" dirty="0"/>
               <a:pPr/>
-              <a:t>5/10/2019</a:t>
+              <a:t>10/26/2021</a:t>
             </a:fld>
             <a:endParaRPr lang="en-US" dirty="0"/>
           </a:p>
@@ -1038,7 +1043,7 @@
             <a:fld id="{B61BEF0D-F0BB-DE4B-95CE-6DB70DBA9567}" type="datetimeFigureOut">
               <a:rPr lang="en-US" dirty="0"/>
               <a:pPr/>
-              <a:t>5/10/2019</a:t>
+              <a:t>10/26/2021</a:t>
             </a:fld>
             <a:endParaRPr lang="en-US" dirty="0"/>
           </a:p>
@@ -1371,7 +1376,7 @@
             <a:fld id="{B61BEF0D-F0BB-DE4B-95CE-6DB70DBA9567}" type="datetimeFigureOut">
               <a:rPr lang="en-US" dirty="0"/>
               <a:pPr/>
-              <a:t>5/10/2019</a:t>
+              <a:t>10/26/2021</a:t>
             </a:fld>
             <a:endParaRPr lang="en-US" dirty="0"/>
           </a:p>
@@ -1688,7 +1693,7 @@
             <a:fld id="{B61BEF0D-F0BB-DE4B-95CE-6DB70DBA9567}" type="datetimeFigureOut">
               <a:rPr lang="en-US" dirty="0"/>
               <a:pPr/>
-              <a:t>5/10/2019</a:t>
+              <a:t>10/26/2021</a:t>
             </a:fld>
             <a:endParaRPr lang="en-US" dirty="0"/>
           </a:p>
@@ -2081,7 +2086,7 @@
             <a:fld id="{B61BEF0D-F0BB-DE4B-95CE-6DB70DBA9567}" type="datetimeFigureOut">
               <a:rPr lang="en-US" dirty="0"/>
               <a:pPr/>
-              <a:t>5/10/2019</a:t>
+              <a:t>10/26/2021</a:t>
             </a:fld>
             <a:endParaRPr lang="en-US" dirty="0"/>
           </a:p>
@@ -2335,7 +2340,7 @@
             <a:fld id="{B61BEF0D-F0BB-DE4B-95CE-6DB70DBA9567}" type="datetimeFigureOut">
               <a:rPr lang="en-US" dirty="0"/>
               <a:pPr/>
-              <a:t>5/10/2019</a:t>
+              <a:t>10/26/2021</a:t>
             </a:fld>
             <a:endParaRPr lang="en-US" dirty="0"/>
           </a:p>
@@ -2594,7 +2599,7 @@
             <a:fld id="{B61BEF0D-F0BB-DE4B-95CE-6DB70DBA9567}" type="datetimeFigureOut">
               <a:rPr lang="en-US" dirty="0"/>
               <a:pPr/>
-              <a:t>5/10/2019</a:t>
+              <a:t>10/26/2021</a:t>
             </a:fld>
             <a:endParaRPr lang="en-US" dirty="0"/>
           </a:p>
@@ -2853,7 +2858,7 @@
             <a:fld id="{B61BEF0D-F0BB-DE4B-95CE-6DB70DBA9567}" type="datetimeFigureOut">
               <a:rPr lang="en-US" dirty="0"/>
               <a:pPr/>
-              <a:t>5/10/2019</a:t>
+              <a:t>10/26/2021</a:t>
             </a:fld>
             <a:endParaRPr lang="en-US" dirty="0"/>
           </a:p>
@@ -3179,7 +3184,7 @@
             <a:fld id="{B61BEF0D-F0BB-DE4B-95CE-6DB70DBA9567}" type="datetimeFigureOut">
               <a:rPr lang="en-US" dirty="0"/>
               <a:pPr/>
-              <a:t>5/10/2019</a:t>
+              <a:t>10/26/2021</a:t>
             </a:fld>
             <a:endParaRPr lang="en-US" dirty="0"/>
           </a:p>
@@ -3499,7 +3504,7 @@
             <a:fld id="{B61BEF0D-F0BB-DE4B-95CE-6DB70DBA9567}" type="datetimeFigureOut">
               <a:rPr lang="en-US" dirty="0"/>
               <a:pPr/>
-              <a:t>5/10/2019</a:t>
+              <a:t>10/26/2021</a:t>
             </a:fld>
             <a:endParaRPr lang="en-US" dirty="0"/>
           </a:p>
@@ -3953,7 +3958,7 @@
             <a:fld id="{B61BEF0D-F0BB-DE4B-95CE-6DB70DBA9567}" type="datetimeFigureOut">
               <a:rPr lang="en-US" dirty="0"/>
               <a:pPr/>
-              <a:t>5/10/2019</a:t>
+              <a:t>10/26/2021</a:t>
             </a:fld>
             <a:endParaRPr lang="en-US" dirty="0"/>
           </a:p>
@@ -4155,7 +4160,7 @@
             <a:fld id="{B61BEF0D-F0BB-DE4B-95CE-6DB70DBA9567}" type="datetimeFigureOut">
               <a:rPr lang="en-US" dirty="0"/>
               <a:pPr/>
-              <a:t>5/10/2019</a:t>
+              <a:t>10/26/2021</a:t>
             </a:fld>
             <a:endParaRPr lang="en-US" dirty="0"/>
           </a:p>
@@ -4329,7 +4334,7 @@
             <a:fld id="{B61BEF0D-F0BB-DE4B-95CE-6DB70DBA9567}" type="datetimeFigureOut">
               <a:rPr lang="en-US" dirty="0"/>
               <a:pPr/>
-              <a:t>5/10/2019</a:t>
+              <a:t>10/26/2021</a:t>
             </a:fld>
             <a:endParaRPr lang="en-US" dirty="0"/>
           </a:p>
@@ -4659,7 +4664,7 @@
             <a:fld id="{B61BEF0D-F0BB-DE4B-95CE-6DB70DBA9567}" type="datetimeFigureOut">
               <a:rPr lang="en-US" dirty="0"/>
               <a:pPr/>
-              <a:t>5/10/2019</a:t>
+              <a:t>10/26/2021</a:t>
             </a:fld>
             <a:endParaRPr lang="en-US" dirty="0"/>
           </a:p>
@@ -5001,7 +5006,7 @@
             <a:fld id="{B61BEF0D-F0BB-DE4B-95CE-6DB70DBA9567}" type="datetimeFigureOut">
               <a:rPr lang="en-US" dirty="0"/>
               <a:pPr/>
-              <a:t>5/10/2019</a:t>
+              <a:t>10/26/2021</a:t>
             </a:fld>
             <a:endParaRPr lang="en-US" dirty="0"/>
           </a:p>
@@ -7115,7 +7120,7 @@
             <a:fld id="{B61BEF0D-F0BB-DE4B-95CE-6DB70DBA9567}" type="datetimeFigureOut">
               <a:rPr lang="en-US" dirty="0"/>
               <a:pPr/>
-              <a:t>5/10/2019</a:t>
+              <a:t>10/26/2021</a:t>
             </a:fld>
             <a:endParaRPr lang="en-US" dirty="0"/>
           </a:p>
@@ -7780,10 +7785,15 @@
             <p:ph idx="1"/>
           </p:nvPr>
         </p:nvSpPr>
-        <p:spPr/>
+        <p:spPr>
+          <a:xfrm>
+            <a:off x="2592925" y="1905001"/>
+            <a:ext cx="8915400" cy="4661262"/>
+          </a:xfrm>
+        </p:spPr>
         <p:txBody>
           <a:bodyPr>
-            <a:normAutofit fontScale="77500" lnSpcReduction="20000"/>
+            <a:normAutofit/>
           </a:bodyPr>
           <a:lstStyle/>
           <a:p>
@@ -7791,24 +7801,24 @@
               <a:buNone/>
             </a:pPr>
             <a:r>
-              <a:rPr lang="en-IN" sz="3100" b="1" dirty="0" smtClean="0">
+              <a:rPr lang="en-IN" sz="3100" b="1" dirty="0">
                 <a:solidFill>
                   <a:schemeClr val="bg2">
                     <a:lumMod val="50000"/>
                   </a:schemeClr>
                 </a:solidFill>
               </a:rPr>
-              <a:t>38)RISHMA </a:t>
-            </a:r>
-            <a:r>
-              <a:rPr lang="en-IN" sz="3100" b="1" dirty="0">
+              <a:t>1</a:t>
+            </a:r>
+            <a:r>
+              <a:rPr lang="en-IN" sz="3100" b="1" dirty="0" smtClean="0">
                 <a:solidFill>
                   <a:schemeClr val="bg2">
                     <a:lumMod val="50000"/>
                   </a:schemeClr>
                 </a:solidFill>
               </a:rPr>
-              <a:t>P</a:t>
+              <a:t>)HARSHIN HARI</a:t>
             </a:r>
           </a:p>
           <a:p>
@@ -7823,22 +7833,17 @@
                   </a:schemeClr>
                 </a:solidFill>
               </a:rPr>
-              <a:t>39)SAHADA FATHIMA</a:t>
-            </a:r>
-          </a:p>
-          <a:p>
-            <a:pPr marL="0" indent="0">
-              <a:buNone/>
-            </a:pPr>
-            <a:r>
-              <a:rPr lang="en-IN" sz="3100" b="1" dirty="0">
+              <a:t>2</a:t>
+            </a:r>
+            <a:r>
+              <a:rPr lang="en-IN" sz="3100" b="1" dirty="0" smtClean="0">
                 <a:solidFill>
                   <a:schemeClr val="bg2">
                     <a:lumMod val="50000"/>
                   </a:schemeClr>
                 </a:solidFill>
               </a:rPr>
-              <a:t>40)SANGEERTH N K</a:t>
+              <a:t>)JASIRA T P</a:t>
             </a:r>
           </a:p>
           <a:p>
@@ -7853,28 +7858,18 @@
                   </a:schemeClr>
                 </a:solidFill>
               </a:rPr>
-              <a:t>41)SHABA</a:t>
-            </a:r>
-          </a:p>
-          <a:p>
-            <a:pPr marL="0" indent="0">
-              <a:buNone/>
-            </a:pPr>
-            <a:r>
-              <a:rPr lang="en-IN" sz="3100" b="1" dirty="0">
+              <a:t>3</a:t>
+            </a:r>
+            <a:r>
+              <a:rPr lang="en-IN" sz="3100" b="1" dirty="0" smtClean="0">
                 <a:solidFill>
                   <a:schemeClr val="bg2">
                     <a:lumMod val="50000"/>
                   </a:schemeClr>
                 </a:solidFill>
               </a:rPr>
-              <a:t>42)SHABEERA</a:t>
-            </a:r>
-          </a:p>
-          <a:p>
-            <a:pPr marL="0" indent="0">
-              <a:buNone/>
-            </a:pPr>
+              <a:t>)SANGEERTH </a:t>
+            </a:r>
             <a:r>
               <a:rPr lang="en-IN" sz="3100" b="1" dirty="0">
                 <a:solidFill>
@@ -7883,7 +7878,7 @@
                   </a:schemeClr>
                 </a:solidFill>
               </a:rPr>
-              <a:t>43)SHABIN </a:t>
+              <a:t>N K</a:t>
             </a:r>
           </a:p>
           <a:p>
@@ -7891,20 +7886,15 @@
               <a:buNone/>
             </a:pPr>
             <a:r>
-              <a:rPr lang="en-IN" sz="3100" b="1" dirty="0">
+              <a:rPr lang="en-IN" sz="3100" b="1" dirty="0" smtClean="0">
                 <a:solidFill>
                   <a:schemeClr val="bg2">
                     <a:lumMod val="50000"/>
                   </a:schemeClr>
                 </a:solidFill>
               </a:rPr>
-              <a:t>44)SHAMITH R</a:t>
-            </a:r>
-          </a:p>
-          <a:p>
-            <a:pPr marL="0" indent="0">
-              <a:buNone/>
-            </a:pPr>
+              <a:t>4)SHAMITH </a:t>
+            </a:r>
             <a:r>
               <a:rPr lang="en-IN" sz="3100" b="1" dirty="0">
                 <a:solidFill>
@@ -7913,7 +7903,7 @@
                   </a:schemeClr>
                 </a:solidFill>
               </a:rPr>
-              <a:t>45)SHARAN NATH C</a:t>
+              <a:t>R</a:t>
             </a:r>
           </a:p>
           <a:p>
@@ -7921,15 +7911,62 @@
               <a:buNone/>
             </a:pPr>
             <a:r>
-              <a:rPr lang="en-IN" sz="3100" b="1" dirty="0">
+              <a:rPr lang="en-IN" sz="3100" b="1" dirty="0" smtClean="0">
                 <a:solidFill>
                   <a:schemeClr val="bg2">
                     <a:lumMod val="50000"/>
                   </a:schemeClr>
                 </a:solidFill>
               </a:rPr>
-              <a:t>46)SHRAVAN SREEDEEP</a:t>
-            </a:r>
+              <a:t>5)SHARAN </a:t>
+            </a:r>
+            <a:r>
+              <a:rPr lang="en-IN" sz="3100" b="1" dirty="0">
+                <a:solidFill>
+                  <a:schemeClr val="bg2">
+                    <a:lumMod val="50000"/>
+                  </a:schemeClr>
+                </a:solidFill>
+              </a:rPr>
+              <a:t>NATH C</a:t>
+            </a:r>
+          </a:p>
+          <a:p>
+            <a:pPr marL="0" indent="0">
+              <a:buNone/>
+            </a:pPr>
+            <a:r>
+              <a:rPr lang="en-IN" sz="3100" b="1" dirty="0" smtClean="0">
+                <a:solidFill>
+                  <a:schemeClr val="bg2">
+                    <a:lumMod val="50000"/>
+                  </a:schemeClr>
+                </a:solidFill>
+              </a:rPr>
+              <a:t>6)SHRAVAN SREEDEEP</a:t>
+            </a:r>
+          </a:p>
+          <a:p>
+            <a:pPr marL="0" indent="0">
+              <a:buNone/>
+            </a:pPr>
+            <a:r>
+              <a:rPr lang="en-IN" sz="3100" b="1" dirty="0" smtClean="0">
+                <a:solidFill>
+                  <a:schemeClr val="bg2">
+                    <a:lumMod val="50000"/>
+                  </a:schemeClr>
+                </a:solidFill>
+              </a:rPr>
+              <a:t>7)SOORYA P</a:t>
+            </a:r>
+            <a:endParaRPr lang="en-IN" sz="3100" b="1" dirty="0">
+              <a:solidFill>
+                <a:schemeClr val="bg2">
+                  <a:lumMod val="50000"/>
+                </a:schemeClr>
+              </a:solidFill>
+            </a:endParaRPr>
           </a:p>
           <a:p>
             <a:endParaRPr lang="en-IN" dirty="0"/>
@@ -9230,8 +9267,20 @@
                 <a:tableStyleId>{5C22544A-7EE6-4342-B048-85BDC9FD1C3A}</a:tableStyleId>
               </a:tblPr>
               <a:tblGrid>
-                <a:gridCol w="4457700"/>
-                <a:gridCol w="4457700"/>
+                <a:gridCol w="4457700">
+                  <a:extLst>
+                    <a:ext uri="{9D8B030D-6E8A-4147-A177-3AD203B41FA5}">
+                      <a16:colId xmlns:a16="http://schemas.microsoft.com/office/drawing/2014/main" val="20000"/>
+                    </a:ext>
+                  </a:extLst>
+                </a:gridCol>
+                <a:gridCol w="4457700">
+                  <a:extLst>
+                    <a:ext uri="{9D8B030D-6E8A-4147-A177-3AD203B41FA5}">
+                      <a16:colId xmlns:a16="http://schemas.microsoft.com/office/drawing/2014/main" val="20001"/>
+                    </a:ext>
+                  </a:extLst>
+                </a:gridCol>
               </a:tblGrid>
               <a:tr h="4958365">
                 <a:tc>
@@ -9566,6 +9615,11 @@
                   </a:txBody>
                   <a:tcPr/>
                 </a:tc>
+                <a:extLst>
+                  <a:ext uri="{0D108BD9-81ED-4DB2-BD59-A6C34878D82A}">
+                    <a16:rowId xmlns:a16="http://schemas.microsoft.com/office/drawing/2014/main" val="10000"/>
+                  </a:ext>
+                </a:extLst>
               </a:tr>
             </a:tbl>
           </a:graphicData>
@@ -9653,8 +9707,20 @@
                 <a:tableStyleId>{5C22544A-7EE6-4342-B048-85BDC9FD1C3A}</a:tableStyleId>
               </a:tblPr>
               <a:tblGrid>
-                <a:gridCol w="4457700"/>
-                <a:gridCol w="4457700"/>
+                <a:gridCol w="4457700">
+                  <a:extLst>
+                    <a:ext uri="{9D8B030D-6E8A-4147-A177-3AD203B41FA5}">
+                      <a16:colId xmlns:a16="http://schemas.microsoft.com/office/drawing/2014/main" val="20000"/>
+                    </a:ext>
+                  </a:extLst>
+                </a:gridCol>
+                <a:gridCol w="4457700">
+                  <a:extLst>
+                    <a:ext uri="{9D8B030D-6E8A-4147-A177-3AD203B41FA5}">
+                      <a16:colId xmlns:a16="http://schemas.microsoft.com/office/drawing/2014/main" val="20001"/>
+                    </a:ext>
+                  </a:extLst>
+                </a:gridCol>
               </a:tblGrid>
               <a:tr h="370840">
                 <a:tc>
@@ -9894,6 +9960,11 @@
                   </a:txBody>
                   <a:tcPr/>
                 </a:tc>
+                <a:extLst>
+                  <a:ext uri="{0D108BD9-81ED-4DB2-BD59-A6C34878D82A}">
+                    <a16:rowId xmlns:a16="http://schemas.microsoft.com/office/drawing/2014/main" val="10000"/>
+                  </a:ext>
+                </a:extLst>
               </a:tr>
             </a:tbl>
           </a:graphicData>
@@ -9981,8 +10052,20 @@
                 <a:tableStyleId>{5C22544A-7EE6-4342-B048-85BDC9FD1C3A}</a:tableStyleId>
               </a:tblPr>
               <a:tblGrid>
-                <a:gridCol w="4457700"/>
-                <a:gridCol w="4457700"/>
+                <a:gridCol w="4457700">
+                  <a:extLst>
+                    <a:ext uri="{9D8B030D-6E8A-4147-A177-3AD203B41FA5}">
+                      <a16:colId xmlns:a16="http://schemas.microsoft.com/office/drawing/2014/main" val="20000"/>
+                    </a:ext>
+                  </a:extLst>
+                </a:gridCol>
+                <a:gridCol w="4457700">
+                  <a:extLst>
+                    <a:ext uri="{9D8B030D-6E8A-4147-A177-3AD203B41FA5}">
+                      <a16:colId xmlns:a16="http://schemas.microsoft.com/office/drawing/2014/main" val="20001"/>
+                    </a:ext>
+                  </a:extLst>
+                </a:gridCol>
               </a:tblGrid>
               <a:tr h="5499278">
                 <a:tc>
@@ -10295,7 +10378,6 @@
                         <a:rPr lang="en-IN" dirty="0" smtClean="0"/>
                         <a:t>break;</a:t>
                       </a:r>
-                      <a:endParaRPr lang="en-IN" dirty="0" smtClean="0"/>
                     </a:p>
                     <a:p>
                       <a:r>
@@ -10333,6 +10415,11 @@
                   </a:txBody>
                   <a:tcPr/>
                 </a:tc>
+                <a:extLst>
+                  <a:ext uri="{0D108BD9-81ED-4DB2-BD59-A6C34878D82A}">
+                    <a16:rowId xmlns:a16="http://schemas.microsoft.com/office/drawing/2014/main" val="10000"/>
+                  </a:ext>
+                </a:extLst>
               </a:tr>
             </a:tbl>
           </a:graphicData>

</xml_diff>